<commit_message>
updated with changes in class
</commit_message>
<xml_diff>
--- a/slides/On-Campus/11_01_Inheritance.pptx
+++ b/slides/On-Campus/11_01_Inheritance.pptx
@@ -1186,7 +1186,7 @@
           <a:p>
             <a:fld id="{4D7E51A5-B478-1E40-8CBB-0DAA8831E99D}" type="datetimeFigureOut">
               <a:rPr lang="en-US" smtClean="0"/>
-              <a:t>11/1/2021</a:t>
+              <a:t>11/1/21</a:t>
             </a:fld>
             <a:endParaRPr lang="en-US"/>
           </a:p>
@@ -1351,7 +1351,7 @@
           <a:p>
             <a:fld id="{D0ED587F-861E-6740-9643-E3DDAE89B8D6}" type="datetimeFigureOut">
               <a:rPr lang="en-US" smtClean="0"/>
-              <a:t>11/1/2021</a:t>
+              <a:t>11/1/21</a:t>
             </a:fld>
             <a:endParaRPr lang="en-US"/>
           </a:p>
@@ -8273,7 +8273,7 @@
 </file>
 
 <file path=ppt/slides/slide10.xml><?xml version="1.0" encoding="utf-8"?>
-<p:sld xmlns:a="http://schemas.openxmlformats.org/drawingml/2006/main" xmlns:r="http://schemas.openxmlformats.org/officeDocument/2006/relationships" xmlns:p="http://schemas.openxmlformats.org/presentationml/2006/main">
+<p:sld xmlns:a="http://schemas.openxmlformats.org/drawingml/2006/main" xmlns:r="http://schemas.openxmlformats.org/officeDocument/2006/relationships" xmlns:p="http://schemas.openxmlformats.org/presentationml/2006/main" show="0">
   <p:cSld>
     <p:spTree>
       <p:nvGrpSpPr>
@@ -10435,13 +10435,13 @@
   <p:clrMapOvr>
     <a:masterClrMapping/>
   </p:clrMapOvr>
-  <mc:AlternateContent xmlns:mc="http://schemas.openxmlformats.org/markup-compatibility/2006" xmlns:p14="http://schemas.microsoft.com/office/powerpoint/2010/main">
-    <mc:Choice Requires="p14">
+  <mc:AlternateContent xmlns:mc="http://schemas.openxmlformats.org/markup-compatibility/2006">
+    <mc:Choice xmlns:p14="http://schemas.microsoft.com/office/powerpoint/2010/main" Requires="p14">
       <p:transition p14:dur="300">
         <p:fade/>
       </p:transition>
     </mc:Choice>
-    <mc:Fallback xmlns="">
+    <mc:Fallback>
       <p:transition>
         <p:fade/>
       </p:transition>
@@ -10451,7 +10451,7 @@
 </file>
 
 <file path=ppt/slides/slide11.xml><?xml version="1.0" encoding="utf-8"?>
-<p:sld xmlns:a="http://schemas.openxmlformats.org/drawingml/2006/main" xmlns:r="http://schemas.openxmlformats.org/officeDocument/2006/relationships" xmlns:p="http://schemas.openxmlformats.org/presentationml/2006/main">
+<p:sld xmlns:a="http://schemas.openxmlformats.org/drawingml/2006/main" xmlns:r="http://schemas.openxmlformats.org/officeDocument/2006/relationships" xmlns:p="http://schemas.openxmlformats.org/presentationml/2006/main" show="0">
   <p:cSld>
     <p:spTree>
       <p:nvGrpSpPr>
@@ -10535,13 +10535,13 @@
   <p:clrMapOvr>
     <a:masterClrMapping/>
   </p:clrMapOvr>
-  <mc:AlternateContent xmlns:mc="http://schemas.openxmlformats.org/markup-compatibility/2006" xmlns:p14="http://schemas.microsoft.com/office/powerpoint/2010/main">
-    <mc:Choice Requires="p14">
+  <mc:AlternateContent xmlns:mc="http://schemas.openxmlformats.org/markup-compatibility/2006">
+    <mc:Choice xmlns:p14="http://schemas.microsoft.com/office/powerpoint/2010/main" Requires="p14">
       <p:transition p14:dur="300">
         <p:fade/>
       </p:transition>
     </mc:Choice>
-    <mc:Fallback xmlns="">
+    <mc:Fallback>
       <p:transition>
         <p:fade/>
       </p:transition>
@@ -10551,7 +10551,7 @@
 </file>
 
 <file path=ppt/slides/slide12.xml><?xml version="1.0" encoding="utf-8"?>
-<p:sld xmlns:a="http://schemas.openxmlformats.org/drawingml/2006/main" xmlns:r="http://schemas.openxmlformats.org/officeDocument/2006/relationships" xmlns:p="http://schemas.openxmlformats.org/presentationml/2006/main">
+<p:sld xmlns:a="http://schemas.openxmlformats.org/drawingml/2006/main" xmlns:r="http://schemas.openxmlformats.org/officeDocument/2006/relationships" xmlns:p="http://schemas.openxmlformats.org/presentationml/2006/main" show="0">
   <p:cSld>
     <p:spTree>
       <p:nvGrpSpPr>
@@ -10977,13 +10977,13 @@
   <p:clrMapOvr>
     <a:masterClrMapping/>
   </p:clrMapOvr>
-  <mc:AlternateContent xmlns:mc="http://schemas.openxmlformats.org/markup-compatibility/2006" xmlns:p14="http://schemas.microsoft.com/office/powerpoint/2010/main">
-    <mc:Choice Requires="p14">
+  <mc:AlternateContent xmlns:mc="http://schemas.openxmlformats.org/markup-compatibility/2006">
+    <mc:Choice xmlns:p14="http://schemas.microsoft.com/office/powerpoint/2010/main" Requires="p14">
       <p:transition p14:dur="300">
         <p:fade/>
       </p:transition>
     </mc:Choice>
-    <mc:Fallback xmlns="">
+    <mc:Fallback>
       <p:transition>
         <p:fade/>
       </p:transition>
@@ -10993,7 +10993,7 @@
 </file>
 
 <file path=ppt/slides/slide13.xml><?xml version="1.0" encoding="utf-8"?>
-<p:sld xmlns:a="http://schemas.openxmlformats.org/drawingml/2006/main" xmlns:r="http://schemas.openxmlformats.org/officeDocument/2006/relationships" xmlns:p="http://schemas.openxmlformats.org/presentationml/2006/main">
+<p:sld xmlns:a="http://schemas.openxmlformats.org/drawingml/2006/main" xmlns:r="http://schemas.openxmlformats.org/officeDocument/2006/relationships" xmlns:p="http://schemas.openxmlformats.org/presentationml/2006/main" show="0">
   <p:cSld>
     <p:spTree>
       <p:nvGrpSpPr>
@@ -13032,13 +13032,13 @@
   <p:clrMapOvr>
     <a:masterClrMapping/>
   </p:clrMapOvr>
-  <mc:AlternateContent xmlns:mc="http://schemas.openxmlformats.org/markup-compatibility/2006" xmlns:p14="http://schemas.microsoft.com/office/powerpoint/2010/main">
-    <mc:Choice Requires="p14">
+  <mc:AlternateContent xmlns:mc="http://schemas.openxmlformats.org/markup-compatibility/2006">
+    <mc:Choice xmlns:p14="http://schemas.microsoft.com/office/powerpoint/2010/main" Requires="p14">
       <p:transition p14:dur="300">
         <p:fade/>
       </p:transition>
     </mc:Choice>
-    <mc:Fallback xmlns="">
+    <mc:Fallback>
       <p:transition>
         <p:fade/>
       </p:transition>
@@ -13617,7 +13617,7 @@
 </file>
 
 <file path=ppt/slides/slide14.xml><?xml version="1.0" encoding="utf-8"?>
-<p:sld xmlns:a="http://schemas.openxmlformats.org/drawingml/2006/main" xmlns:r="http://schemas.openxmlformats.org/officeDocument/2006/relationships" xmlns:p="http://schemas.openxmlformats.org/presentationml/2006/main">
+<p:sld xmlns:a="http://schemas.openxmlformats.org/drawingml/2006/main" xmlns:r="http://schemas.openxmlformats.org/officeDocument/2006/relationships" xmlns:p="http://schemas.openxmlformats.org/presentationml/2006/main" show="0">
   <p:cSld>
     <p:spTree>
       <p:nvGrpSpPr>
@@ -13842,13 +13842,13 @@
   <p:clrMapOvr>
     <a:masterClrMapping/>
   </p:clrMapOvr>
-  <mc:AlternateContent xmlns:mc="http://schemas.openxmlformats.org/markup-compatibility/2006" xmlns:p14="http://schemas.microsoft.com/office/powerpoint/2010/main">
-    <mc:Choice Requires="p14">
+  <mc:AlternateContent xmlns:mc="http://schemas.openxmlformats.org/markup-compatibility/2006">
+    <mc:Choice xmlns:p14="http://schemas.microsoft.com/office/powerpoint/2010/main" Requires="p14">
       <p:transition p14:dur="300">
         <p:fade/>
       </p:transition>
     </mc:Choice>
-    <mc:Fallback xmlns="">
+    <mc:Fallback>
       <p:transition>
         <p:fade/>
       </p:transition>
@@ -13858,7 +13858,7 @@
 </file>
 
 <file path=ppt/slides/slide15.xml><?xml version="1.0" encoding="utf-8"?>
-<p:sld xmlns:a="http://schemas.openxmlformats.org/drawingml/2006/main" xmlns:r="http://schemas.openxmlformats.org/officeDocument/2006/relationships" xmlns:p="http://schemas.openxmlformats.org/presentationml/2006/main">
+<p:sld xmlns:a="http://schemas.openxmlformats.org/drawingml/2006/main" xmlns:r="http://schemas.openxmlformats.org/officeDocument/2006/relationships" xmlns:p="http://schemas.openxmlformats.org/presentationml/2006/main" show="0">
   <p:cSld>
     <p:spTree>
       <p:nvGrpSpPr>
@@ -14614,13 +14614,13 @@
   <p:clrMapOvr>
     <a:masterClrMapping/>
   </p:clrMapOvr>
-  <mc:AlternateContent xmlns:mc="http://schemas.openxmlformats.org/markup-compatibility/2006" xmlns:p14="http://schemas.microsoft.com/office/powerpoint/2010/main">
-    <mc:Choice Requires="p14">
+  <mc:AlternateContent xmlns:mc="http://schemas.openxmlformats.org/markup-compatibility/2006">
+    <mc:Choice xmlns:p14="http://schemas.microsoft.com/office/powerpoint/2010/main" Requires="p14">
       <p:transition p14:dur="300">
         <p:fade/>
       </p:transition>
     </mc:Choice>
-    <mc:Fallback xmlns="">
+    <mc:Fallback>
       <p:transition>
         <p:fade/>
       </p:transition>
@@ -14930,7 +14930,7 @@
 </file>
 
 <file path=ppt/slides/slide16.xml><?xml version="1.0" encoding="utf-8"?>
-<p:sld xmlns:a="http://schemas.openxmlformats.org/drawingml/2006/main" xmlns:r="http://schemas.openxmlformats.org/officeDocument/2006/relationships" xmlns:p="http://schemas.openxmlformats.org/presentationml/2006/main">
+<p:sld xmlns:a="http://schemas.openxmlformats.org/drawingml/2006/main" xmlns:r="http://schemas.openxmlformats.org/officeDocument/2006/relationships" xmlns:p="http://schemas.openxmlformats.org/presentationml/2006/main" show="0">
   <p:cSld>
     <p:spTree>
       <p:nvGrpSpPr>
@@ -15827,13 +15827,13 @@
   <p:clrMapOvr>
     <a:masterClrMapping/>
   </p:clrMapOvr>
-  <mc:AlternateContent xmlns:mc="http://schemas.openxmlformats.org/markup-compatibility/2006" xmlns:p14="http://schemas.microsoft.com/office/powerpoint/2010/main">
-    <mc:Choice Requires="p14">
+  <mc:AlternateContent xmlns:mc="http://schemas.openxmlformats.org/markup-compatibility/2006">
+    <mc:Choice xmlns:p14="http://schemas.microsoft.com/office/powerpoint/2010/main" Requires="p14">
       <p:transition p14:dur="300">
         <p:fade/>
       </p:transition>
     </mc:Choice>
-    <mc:Fallback xmlns="">
+    <mc:Fallback>
       <p:transition>
         <p:fade/>
       </p:transition>
@@ -16179,7 +16179,7 @@
 </file>
 
 <file path=ppt/slides/slide17.xml><?xml version="1.0" encoding="utf-8"?>
-<p:sld xmlns:a="http://schemas.openxmlformats.org/drawingml/2006/main" xmlns:r="http://schemas.openxmlformats.org/officeDocument/2006/relationships" xmlns:p="http://schemas.openxmlformats.org/presentationml/2006/main">
+<p:sld xmlns:a="http://schemas.openxmlformats.org/drawingml/2006/main" xmlns:r="http://schemas.openxmlformats.org/officeDocument/2006/relationships" xmlns:p="http://schemas.openxmlformats.org/presentationml/2006/main" show="0">
   <p:cSld>
     <p:spTree>
       <p:nvGrpSpPr>
@@ -16258,13 +16258,13 @@
   <p:clrMapOvr>
     <a:masterClrMapping/>
   </p:clrMapOvr>
-  <mc:AlternateContent xmlns:mc="http://schemas.openxmlformats.org/markup-compatibility/2006" xmlns:p14="http://schemas.microsoft.com/office/powerpoint/2010/main">
-    <mc:Choice Requires="p14">
+  <mc:AlternateContent xmlns:mc="http://schemas.openxmlformats.org/markup-compatibility/2006">
+    <mc:Choice xmlns:p14="http://schemas.microsoft.com/office/powerpoint/2010/main" Requires="p14">
       <p:transition p14:dur="300">
         <p:fade/>
       </p:transition>
     </mc:Choice>
-    <mc:Fallback xmlns="">
+    <mc:Fallback>
       <p:transition>
         <p:fade/>
       </p:transition>
@@ -19536,7 +19536,7 @@
         <p:spPr>
           <a:xfrm>
             <a:off x="7228114" y="362857"/>
-            <a:ext cx="6125029" cy="707886"/>
+            <a:ext cx="6125029" cy="1323439"/>
           </a:xfrm>
           <a:prstGeom prst="rect">
             <a:avLst/>
@@ -19559,7 +19559,7 @@
           <a:p>
             <a:r>
               <a:rPr lang="en-US" dirty="0"/>
-              <a:t>How comfortable are you with arrays and 2D arrays?</a:t>
+              <a:t>Brainstorm everything you know about objects and classes. What do you struggle with? Can your table group explain? </a:t>
             </a:r>
           </a:p>
         </p:txBody>
@@ -27581,7 +27581,7 @@
 </file>
 
 <file path=ppt/slides/slide3.xml><?xml version="1.0" encoding="utf-8"?>
-<p:sld xmlns:a="http://schemas.openxmlformats.org/drawingml/2006/main" xmlns:r="http://schemas.openxmlformats.org/officeDocument/2006/relationships" xmlns:p="http://schemas.openxmlformats.org/presentationml/2006/main">
+<p:sld xmlns:a="http://schemas.openxmlformats.org/drawingml/2006/main" xmlns:r="http://schemas.openxmlformats.org/officeDocument/2006/relationships" xmlns:p="http://schemas.openxmlformats.org/presentationml/2006/main" show="0">
   <p:cSld>
     <p:spTree>
       <p:nvGrpSpPr>
@@ -27883,13 +27883,13 @@
   <p:clrMapOvr>
     <a:masterClrMapping/>
   </p:clrMapOvr>
-  <mc:AlternateContent xmlns:mc="http://schemas.openxmlformats.org/markup-compatibility/2006" xmlns:p14="http://schemas.microsoft.com/office/powerpoint/2010/main">
-    <mc:Choice Requires="p14">
+  <mc:AlternateContent xmlns:mc="http://schemas.openxmlformats.org/markup-compatibility/2006">
+    <mc:Choice xmlns:p14="http://schemas.microsoft.com/office/powerpoint/2010/main" Requires="p14">
       <p:transition p14:dur="300">
         <p:fade/>
       </p:transition>
     </mc:Choice>
-    <mc:Fallback xmlns="">
+    <mc:Fallback>
       <p:transition>
         <p:fade/>
       </p:transition>
@@ -28032,7 +28032,7 @@
 </file>
 
 <file path=ppt/slides/slide4.xml><?xml version="1.0" encoding="utf-8"?>
-<p:sld xmlns:a="http://schemas.openxmlformats.org/drawingml/2006/main" xmlns:r="http://schemas.openxmlformats.org/officeDocument/2006/relationships" xmlns:p="http://schemas.openxmlformats.org/presentationml/2006/main">
+<p:sld xmlns:a="http://schemas.openxmlformats.org/drawingml/2006/main" xmlns:r="http://schemas.openxmlformats.org/officeDocument/2006/relationships" xmlns:p="http://schemas.openxmlformats.org/presentationml/2006/main" show="0">
   <p:cSld>
     <p:spTree>
       <p:nvGrpSpPr>
@@ -28462,13 +28462,13 @@
   <p:clrMapOvr>
     <a:masterClrMapping/>
   </p:clrMapOvr>
-  <mc:AlternateContent xmlns:mc="http://schemas.openxmlformats.org/markup-compatibility/2006" xmlns:p14="http://schemas.microsoft.com/office/powerpoint/2010/main">
-    <mc:Choice Requires="p14">
+  <mc:AlternateContent xmlns:mc="http://schemas.openxmlformats.org/markup-compatibility/2006">
+    <mc:Choice xmlns:p14="http://schemas.microsoft.com/office/powerpoint/2010/main" Requires="p14">
       <p:transition p14:dur="300">
         <p:fade/>
       </p:transition>
     </mc:Choice>
-    <mc:Fallback xmlns="">
+    <mc:Fallback>
       <p:transition>
         <p:fade/>
       </p:transition>
@@ -28602,7 +28602,7 @@
 </file>
 
 <file path=ppt/slides/slide5.xml><?xml version="1.0" encoding="utf-8"?>
-<p:sld xmlns:a="http://schemas.openxmlformats.org/drawingml/2006/main" xmlns:r="http://schemas.openxmlformats.org/officeDocument/2006/relationships" xmlns:p="http://schemas.openxmlformats.org/presentationml/2006/main">
+<p:sld xmlns:a="http://schemas.openxmlformats.org/drawingml/2006/main" xmlns:r="http://schemas.openxmlformats.org/officeDocument/2006/relationships" xmlns:p="http://schemas.openxmlformats.org/presentationml/2006/main" show="0">
   <p:cSld>
     <p:spTree>
       <p:nvGrpSpPr>
@@ -29283,13 +29283,13 @@
   <p:clrMapOvr>
     <a:masterClrMapping/>
   </p:clrMapOvr>
-  <mc:AlternateContent xmlns:mc="http://schemas.openxmlformats.org/markup-compatibility/2006" xmlns:p14="http://schemas.microsoft.com/office/powerpoint/2010/main">
-    <mc:Choice Requires="p14">
+  <mc:AlternateContent xmlns:mc="http://schemas.openxmlformats.org/markup-compatibility/2006">
+    <mc:Choice xmlns:p14="http://schemas.microsoft.com/office/powerpoint/2010/main" Requires="p14">
       <p:transition p14:dur="300">
         <p:fade/>
       </p:transition>
     </mc:Choice>
-    <mc:Fallback xmlns="">
+    <mc:Fallback>
       <p:transition>
         <p:fade/>
       </p:transition>
@@ -29515,7 +29515,7 @@
 </file>
 
 <file path=ppt/slides/slide6.xml><?xml version="1.0" encoding="utf-8"?>
-<p:sld xmlns:a="http://schemas.openxmlformats.org/drawingml/2006/main" xmlns:r="http://schemas.openxmlformats.org/officeDocument/2006/relationships" xmlns:p="http://schemas.openxmlformats.org/presentationml/2006/main">
+<p:sld xmlns:a="http://schemas.openxmlformats.org/drawingml/2006/main" xmlns:r="http://schemas.openxmlformats.org/officeDocument/2006/relationships" xmlns:p="http://schemas.openxmlformats.org/presentationml/2006/main" show="0">
   <p:cSld>
     <p:spTree>
       <p:nvGrpSpPr>
@@ -32262,13 +32262,13 @@
   <p:clrMapOvr>
     <a:masterClrMapping/>
   </p:clrMapOvr>
-  <mc:AlternateContent xmlns:mc="http://schemas.openxmlformats.org/markup-compatibility/2006" xmlns:p14="http://schemas.microsoft.com/office/powerpoint/2010/main">
-    <mc:Choice Requires="p14">
+  <mc:AlternateContent xmlns:mc="http://schemas.openxmlformats.org/markup-compatibility/2006">
+    <mc:Choice xmlns:p14="http://schemas.microsoft.com/office/powerpoint/2010/main" Requires="p14">
       <p:transition p14:dur="300">
         <p:fade/>
       </p:transition>
     </mc:Choice>
-    <mc:Fallback xmlns="">
+    <mc:Fallback>
       <p:transition>
         <p:fade/>
       </p:transition>
@@ -32278,7 +32278,7 @@
 </file>
 
 <file path=ppt/slides/slide7.xml><?xml version="1.0" encoding="utf-8"?>
-<p:sld xmlns:a="http://schemas.openxmlformats.org/drawingml/2006/main" xmlns:r="http://schemas.openxmlformats.org/officeDocument/2006/relationships" xmlns:p="http://schemas.openxmlformats.org/presentationml/2006/main">
+<p:sld xmlns:a="http://schemas.openxmlformats.org/drawingml/2006/main" xmlns:r="http://schemas.openxmlformats.org/officeDocument/2006/relationships" xmlns:p="http://schemas.openxmlformats.org/presentationml/2006/main" show="0">
   <p:cSld>
     <p:spTree>
       <p:nvGrpSpPr>
@@ -32813,13 +32813,13 @@
   <p:clrMapOvr>
     <a:masterClrMapping/>
   </p:clrMapOvr>
-  <mc:AlternateContent xmlns:mc="http://schemas.openxmlformats.org/markup-compatibility/2006" xmlns:p14="http://schemas.microsoft.com/office/powerpoint/2010/main">
-    <mc:Choice Requires="p14">
+  <mc:AlternateContent xmlns:mc="http://schemas.openxmlformats.org/markup-compatibility/2006">
+    <mc:Choice xmlns:p14="http://schemas.microsoft.com/office/powerpoint/2010/main" Requires="p14">
       <p:transition p14:dur="300">
         <p:fade/>
       </p:transition>
     </mc:Choice>
-    <mc:Fallback xmlns="">
+    <mc:Fallback>
       <p:transition>
         <p:fade/>
       </p:transition>
@@ -33017,7 +33017,7 @@
 </file>
 
 <file path=ppt/slides/slide8.xml><?xml version="1.0" encoding="utf-8"?>
-<p:sld xmlns:a="http://schemas.openxmlformats.org/drawingml/2006/main" xmlns:r="http://schemas.openxmlformats.org/officeDocument/2006/relationships" xmlns:p="http://schemas.openxmlformats.org/presentationml/2006/main">
+<p:sld xmlns:a="http://schemas.openxmlformats.org/drawingml/2006/main" xmlns:r="http://schemas.openxmlformats.org/officeDocument/2006/relationships" xmlns:p="http://schemas.openxmlformats.org/presentationml/2006/main" show="0">
   <p:cSld>
     <p:spTree>
       <p:nvGrpSpPr>
@@ -33698,13 +33698,13 @@
   <p:clrMapOvr>
     <a:masterClrMapping/>
   </p:clrMapOvr>
-  <mc:AlternateContent xmlns:mc="http://schemas.openxmlformats.org/markup-compatibility/2006" xmlns:p14="http://schemas.microsoft.com/office/powerpoint/2010/main">
-    <mc:Choice Requires="p14">
+  <mc:AlternateContent xmlns:mc="http://schemas.openxmlformats.org/markup-compatibility/2006">
+    <mc:Choice xmlns:p14="http://schemas.microsoft.com/office/powerpoint/2010/main" Requires="p14">
       <p:transition p14:dur="300">
         <p:fade/>
       </p:transition>
     </mc:Choice>
-    <mc:Fallback xmlns="">
+    <mc:Fallback>
       <p:transition>
         <p:fade/>
       </p:transition>
@@ -33838,7 +33838,7 @@
 </file>
 
 <file path=ppt/slides/slide9.xml><?xml version="1.0" encoding="utf-8"?>
-<p:sld xmlns:a="http://schemas.openxmlformats.org/drawingml/2006/main" xmlns:r="http://schemas.openxmlformats.org/officeDocument/2006/relationships" xmlns:p="http://schemas.openxmlformats.org/presentationml/2006/main">
+<p:sld xmlns:a="http://schemas.openxmlformats.org/drawingml/2006/main" xmlns:r="http://schemas.openxmlformats.org/officeDocument/2006/relationships" xmlns:p="http://schemas.openxmlformats.org/presentationml/2006/main" show="0">
   <p:cSld>
     <p:spTree>
       <p:nvGrpSpPr>
@@ -36364,13 +36364,13 @@
   <p:clrMapOvr>
     <a:masterClrMapping/>
   </p:clrMapOvr>
-  <mc:AlternateContent xmlns:mc="http://schemas.openxmlformats.org/markup-compatibility/2006" xmlns:p14="http://schemas.microsoft.com/office/powerpoint/2010/main">
-    <mc:Choice Requires="p14">
+  <mc:AlternateContent xmlns:mc="http://schemas.openxmlformats.org/markup-compatibility/2006">
+    <mc:Choice xmlns:p14="http://schemas.microsoft.com/office/powerpoint/2010/main" Requires="p14">
       <p:transition p14:dur="300">
         <p:fade/>
       </p:transition>
     </mc:Choice>
-    <mc:Fallback xmlns="">
+    <mc:Fallback>
       <p:transition>
         <p:fade/>
       </p:transition>

</xml_diff>